<commit_message>
Adding AWS reference for clarity
</commit_message>
<xml_diff>
--- a/OctopusDeployFundamentals/Module1-Infrastructure/Slides/Module1Class3-InstallingAWindowsTentacle.pptx
+++ b/OctopusDeployFundamentals/Module1-Infrastructure/Slides/Module1Class3-InstallingAWindowsTentacle.pptx
@@ -1162,6 +1162,79 @@
                 <a:latin typeface="Consolas" panose="020B0609020204030204" pitchFamily="49" charset="0"/>
               </a:rPr>
               <a:t>DEMO</a:t>
+            </a:r>
+          </a:p>
+          <a:p>
+            <a:pPr marL="158750" indent="0">
+              <a:buNone/>
+            </a:pPr>
+            <a:endParaRPr lang="en-GB" b="0" dirty="0">
+              <a:solidFill>
+                <a:srgbClr val="D4D4D4"/>
+              </a:solidFill>
+              <a:effectLst/>
+              <a:latin typeface="Consolas" panose="020B0609020204030204" pitchFamily="49" charset="0"/>
+            </a:endParaRPr>
+          </a:p>
+          <a:p>
+            <a:pPr marL="158750" marR="0" lvl="0" indent="0" algn="l" defTabSz="914400" rtl="0" eaLnBrk="1" fontAlgn="auto" latinLnBrk="0" hangingPunct="1">
+              <a:lnSpc>
+                <a:spcPct val="100000"/>
+              </a:lnSpc>
+              <a:spcBef>
+                <a:spcPts val="0"/>
+              </a:spcBef>
+              <a:spcAft>
+                <a:spcPts val="0"/>
+              </a:spcAft>
+              <a:buClr>
+                <a:srgbClr val="000000"/>
+              </a:buClr>
+              <a:buSzPts val="1100"/>
+              <a:buFont typeface="Arial"/>
+              <a:buNone/>
+              <a:tabLst/>
+              <a:defRPr/>
+            </a:pPr>
+            <a:r>
+              <a:rPr lang="en-GB" b="0" dirty="0">
+                <a:solidFill>
+                  <a:srgbClr val="D4D4D4"/>
+                </a:solidFill>
+                <a:effectLst/>
+                <a:latin typeface="Consolas" panose="020B0609020204030204" pitchFamily="49" charset="0"/>
+              </a:rPr>
+              <a:t>For this demo, we're using a Windows </a:t>
+            </a:r>
+            <a:r>
+              <a:rPr lang="en-GB" b="0" dirty="0" err="1">
+                <a:solidFill>
+                  <a:srgbClr val="D4D4D4"/>
+                </a:solidFill>
+                <a:effectLst/>
+                <a:latin typeface="Consolas" panose="020B0609020204030204" pitchFamily="49" charset="0"/>
+              </a:rPr>
+              <a:t>intance</a:t>
+            </a:r>
+            <a:r>
+              <a:rPr lang="en-GB" b="0" dirty="0">
+                <a:solidFill>
+                  <a:srgbClr val="D4D4D4"/>
+                </a:solidFill>
+                <a:effectLst/>
+                <a:latin typeface="Consolas" panose="020B0609020204030204" pitchFamily="49" charset="0"/>
+              </a:rPr>
+              <a:t> running in AWS EC2. </a:t>
+            </a:r>
+            <a:r>
+              <a:rPr lang="en-GB" b="0">
+                <a:solidFill>
+                  <a:srgbClr val="D4D4D4"/>
+                </a:solidFill>
+                <a:effectLst/>
+                <a:latin typeface="Consolas" panose="020B0609020204030204" pitchFamily="49" charset="0"/>
+              </a:rPr>
+              <a:t>However, the process is the same, regardless of where the Windows machine is hosted</a:t>
             </a:r>
           </a:p>
           <a:p>

</xml_diff>

<commit_message>
script updates during recording
</commit_message>
<xml_diff>
--- a/OctopusDeployFundamentals/Module1-Infrastructure/Slides/Module1Class3-InstallingAWindowsTentacle.pptx
+++ b/OctopusDeployFundamentals/Module1-Infrastructure/Slides/Module1Class3-InstallingAWindowsTentacle.pptx
@@ -831,6 +831,33 @@
             </a:r>
           </a:p>
           <a:p>
+            <a:pPr marL="158750" indent="0">
+              <a:buNone/>
+            </a:pPr>
+            <a:endParaRPr lang="en-GB" b="0" dirty="0">
+              <a:solidFill>
+                <a:srgbClr val="D4D4D4"/>
+              </a:solidFill>
+              <a:effectLst/>
+              <a:latin typeface="Consolas" panose="020B0609020204030204" pitchFamily="49" charset="0"/>
+            </a:endParaRPr>
+          </a:p>
+          <a:p>
+            <a:pPr marL="158750" indent="0">
+              <a:buNone/>
+            </a:pPr>
+            <a:r>
+              <a:rPr lang="en-GB" b="0" dirty="0">
+                <a:solidFill>
+                  <a:srgbClr val="D4D4D4"/>
+                </a:solidFill>
+                <a:effectLst/>
+                <a:latin typeface="Consolas" panose="020B0609020204030204" pitchFamily="49" charset="0"/>
+              </a:rPr>
+              <a:t>We’re going to cover…</a:t>
+            </a:r>
+          </a:p>
+          <a:p>
             <a:endParaRPr lang="en-GB" dirty="0"/>
           </a:p>
         </p:txBody>
@@ -942,8 +969,20 @@
                 <a:effectLst/>
                 <a:latin typeface="Consolas" panose="020B0609020204030204" pitchFamily="49" charset="0"/>
               </a:rPr>
-              <a:t>We will cover:</a:t>
+              <a:t>We’re going to cover…</a:t>
             </a:r>
+          </a:p>
+          <a:p>
+            <a:pPr marL="158750" indent="0">
+              <a:buNone/>
+            </a:pPr>
+            <a:endParaRPr lang="en-GB" b="0" dirty="0">
+              <a:solidFill>
+                <a:srgbClr val="D4D4D4"/>
+              </a:solidFill>
+              <a:effectLst/>
+              <a:latin typeface="Consolas" panose="020B0609020204030204" pitchFamily="49" charset="0"/>
+            </a:endParaRPr>
           </a:p>
           <a:p>
             <a:pPr marL="158750" indent="0">
@@ -1017,7 +1056,7 @@
                 <a:effectLst/>
                 <a:latin typeface="Consolas" panose="020B0609020204030204" pitchFamily="49" charset="0"/>
               </a:rPr>
-              <a:t>- Installing the tentacle on Windows</a:t>
+              <a:t>- Installing the tentacle on Windows and configuring it in Listening mode</a:t>
             </a:r>
           </a:p>
           <a:p>
@@ -1049,7 +1088,7 @@
                 <a:effectLst/>
                 <a:latin typeface="Consolas" panose="020B0609020204030204" pitchFamily="49" charset="0"/>
               </a:rPr>
-              <a:t>- Configuring the tentacle in Listening mode</a:t>
+              <a:t>- As well as the difference between listening and polling tentacles, and when to use each</a:t>
             </a:r>
           </a:p>
         </p:txBody>
@@ -1177,6 +1216,33 @@
             </a:endParaRPr>
           </a:p>
           <a:p>
+            <a:pPr marL="158750" indent="0">
+              <a:buNone/>
+            </a:pPr>
+            <a:r>
+              <a:rPr lang="en-GB" b="0" dirty="0">
+                <a:solidFill>
+                  <a:srgbClr val="D4D4D4"/>
+                </a:solidFill>
+                <a:effectLst/>
+                <a:latin typeface="Consolas" panose="020B0609020204030204" pitchFamily="49" charset="0"/>
+              </a:rPr>
+              <a:t>Let’s get started.</a:t>
+            </a:r>
+          </a:p>
+          <a:p>
+            <a:pPr marL="158750" indent="0">
+              <a:buNone/>
+            </a:pPr>
+            <a:endParaRPr lang="en-GB" b="0" dirty="0">
+              <a:solidFill>
+                <a:srgbClr val="D4D4D4"/>
+              </a:solidFill>
+              <a:effectLst/>
+              <a:latin typeface="Consolas" panose="020B0609020204030204" pitchFamily="49" charset="0"/>
+            </a:endParaRPr>
+          </a:p>
+          <a:p>
             <a:pPr marL="158750" marR="0" lvl="0" indent="0" algn="l" defTabSz="914400" rtl="0" eaLnBrk="1" fontAlgn="auto" latinLnBrk="0" hangingPunct="1">
               <a:lnSpc>
                 <a:spcPct val="100000"/>
@@ -1224,17 +1290,7 @@
                 <a:effectLst/>
                 <a:latin typeface="Consolas" panose="020B0609020204030204" pitchFamily="49" charset="0"/>
               </a:rPr>
-              <a:t> running in AWS EC2. </a:t>
-            </a:r>
-            <a:r>
-              <a:rPr lang="en-GB" b="0">
-                <a:solidFill>
-                  <a:srgbClr val="D4D4D4"/>
-                </a:solidFill>
-                <a:effectLst/>
-                <a:latin typeface="Consolas" panose="020B0609020204030204" pitchFamily="49" charset="0"/>
-              </a:rPr>
-              <a:t>However, the process is the same, regardless of where the Windows machine is hosted</a:t>
+              <a:t> running in AWS EC2. However, the process is the same, regardless of where the Windows machine is hosted</a:t>
             </a:r>
           </a:p>
           <a:p>
@@ -1486,7 +1542,7 @@
                 <a:effectLst/>
                 <a:latin typeface="Consolas" panose="020B0609020204030204" pitchFamily="49" charset="0"/>
               </a:rPr>
-              <a:t>You can find your Octopus Server Thumbprint by logging into Octopus and navigating to Configuration / Thumbprint.</a:t>
+              <a:t>You can find your Octopus Server Thumbprint by logging into your Octopus web portal, and navigating to Configuration / Thumbprint.</a:t>
             </a:r>
           </a:p>
           <a:p>
@@ -1701,7 +1757,7 @@
                 <a:effectLst/>
                 <a:latin typeface="Consolas" panose="020B0609020204030204" pitchFamily="49" charset="0"/>
               </a:rPr>
-              <a:t>Here are some tips for configuring a listening Tentacle.</a:t>
+              <a:t>Here are some tips for configuring an Octopus Tentacle.</a:t>
             </a:r>
           </a:p>
           <a:p>
@@ -1785,7 +1841,27 @@
                 <a:effectLst/>
                 <a:latin typeface="Consolas" panose="020B0609020204030204" pitchFamily="49" charset="0"/>
               </a:rPr>
-              <a:t> You can manage software updates for your Tentacle in your Octopus web portal.</a:t>
+              <a:t> You can manage software updates for your Tentacle in your </a:t>
+            </a:r>
+            <a:r>
+              <a:rPr lang="en-GB" b="0">
+                <a:solidFill>
+                  <a:srgbClr val="D4D4D4"/>
+                </a:solidFill>
+                <a:effectLst/>
+                <a:latin typeface="Consolas" panose="020B0609020204030204" pitchFamily="49" charset="0"/>
+              </a:rPr>
+              <a:t>Octopus Deploy </a:t>
+            </a:r>
+            <a:r>
+              <a:rPr lang="en-GB" b="0" dirty="0">
+                <a:solidFill>
+                  <a:srgbClr val="D4D4D4"/>
+                </a:solidFill>
+                <a:effectLst/>
+                <a:latin typeface="Consolas" panose="020B0609020204030204" pitchFamily="49" charset="0"/>
+              </a:rPr>
+              <a:t>web portal.</a:t>
             </a:r>
           </a:p>
           <a:p>
@@ -6740,6 +6816,9 @@
                     <p:cTn id="3" fill="hold">
                       <p:stCondLst>
                         <p:cond delay="indefinite"/>
+                        <p:cond evt="onBegin" delay="0">
+                          <p:tn val="2"/>
+                        </p:cond>
                       </p:stCondLst>
                       <p:childTnLst>
                         <p:par>
@@ -6749,7 +6828,7 @@
                             </p:stCondLst>
                             <p:childTnLst>
                               <p:par>
-                                <p:cTn id="5" presetID="10" presetClass="entr" presetSubtype="0" fill="hold" nodeType="clickEffect">
+                                <p:cTn id="5" presetID="10" presetClass="entr" presetSubtype="0" fill="hold" nodeType="withEffect">
                                   <p:stCondLst>
                                     <p:cond delay="0"/>
                                   </p:stCondLst>

</xml_diff>

<commit_message>
oops, needed to change the master slide.
</commit_message>
<xml_diff>
--- a/OctopusDeployFundamentals/Module1-Infrastructure/Slides/Module1Class3-InstallingAWindowsTentacle.pptx
+++ b/OctopusDeployFundamentals/Module1-Infrastructure/Slides/Module1Class3-InstallingAWindowsTentacle.pptx
@@ -5833,7 +5833,7 @@
         <p:spPr>
           <a:xfrm>
             <a:off x="226750" y="2581675"/>
-            <a:ext cx="2171100" cy="892800"/>
+            <a:ext cx="2171100" cy="1077188"/>
           </a:xfrm>
           <a:prstGeom prst="rect">
             <a:avLst/>
@@ -5899,7 +5899,7 @@
             </a:pPr>
             <a:r>
               <a:rPr lang="en" sz="1200" dirty="0"/>
-              <a:t>Class 1: Environments</a:t>
+              <a:t>Class 3: Installing a Windows Tentacle</a:t>
             </a:r>
             <a:endParaRPr sz="1200" dirty="0"/>
           </a:p>

</xml_diff>